<commit_message>
Update the Ethic 2 Page
</commit_message>
<xml_diff>
--- a/Bank_Customer_Churn_V2.pptx
+++ b/Bank_Customer_Churn_V2.pptx
@@ -250,7 +250,7 @@
           <a:p>
             <a:fld id="{D214AEED-FF0D-4512-BD5F-9F077F06D9A7}" type="datetimeFigureOut">
               <a:rPr lang="en-US" smtClean="0"/>
-              <a:t>6/24/2023</a:t>
+              <a:t>6/24/23</a:t>
             </a:fld>
             <a:endParaRPr lang="en-US" dirty="0"/>
           </a:p>
@@ -427,7 +427,7 @@
           <a:p>
             <a:fld id="{39AF9B45-E22A-4A9C-91D5-81685A72A6FA}" type="datetimeFigureOut">
               <a:rPr lang="en-US" smtClean="0"/>
-              <a:t>6/24/2023</a:t>
+              <a:t>6/24/23</a:t>
             </a:fld>
             <a:endParaRPr lang="en-US" dirty="0"/>
           </a:p>
@@ -30580,7 +30580,7 @@
         </p:blipFill>
         <p:spPr>
           <a:xfrm>
-            <a:off x="1588" y="0"/>
+            <a:off x="3175" y="215757"/>
             <a:ext cx="12188825" cy="6858000"/>
           </a:xfrm>
         </p:spPr>
@@ -30638,19 +30638,19 @@
         </p:nvSpPr>
         <p:spPr>
           <a:xfrm>
-            <a:off x="5638800" y="1173329"/>
-            <a:ext cx="2743200" cy="365760"/>
+            <a:off x="5638800" y="993584"/>
+            <a:ext cx="2971800" cy="375238"/>
           </a:xfrm>
         </p:spPr>
         <p:txBody>
           <a:bodyPr vert="horz" lIns="91440" tIns="45720" rIns="91440" bIns="45720" rtlCol="0" anchor="t">
-            <a:normAutofit/>
+            <a:noAutofit/>
           </a:bodyPr>
           <a:lstStyle/>
           <a:p>
             <a:r>
               <a:rPr lang="en-ZA" dirty="0"/>
-              <a:t>UNIQUE</a:t>
+              <a:t>Privacy &amp; Data Security</a:t>
             </a:r>
           </a:p>
         </p:txBody>
@@ -30683,7 +30683,7 @@
           <a:p>
             <a:r>
               <a:rPr lang="en-ZA" dirty="0"/>
-              <a:t>Only product specifically dedicated to investment tools for business</a:t>
+              <a:t>The model requires access to detailed customer data. This could potentially infringe on privacy and data security</a:t>
             </a:r>
           </a:p>
           <a:p>
@@ -30719,7 +30719,7 @@
           <a:p>
             <a:r>
               <a:rPr lang="en-ZA" dirty="0"/>
-              <a:t>FIRST TO MARKET</a:t>
+              <a:t>Transparency</a:t>
             </a:r>
             <a:endParaRPr lang="en-US" dirty="0"/>
           </a:p>
@@ -30753,7 +30753,7 @@
           <a:p>
             <a:r>
               <a:rPr lang="en-ZA" dirty="0"/>
-              <a:t>First beautifully designed product that's both stylish and functional</a:t>
+              <a:t>The potential lack of transparency could lead to mistrust and dissatisfaction.</a:t>
             </a:r>
             <a:endParaRPr lang="en-US" dirty="0"/>
           </a:p>
@@ -30777,7 +30777,7 @@
         </p:nvSpPr>
         <p:spPr>
           <a:xfrm>
-            <a:off x="8686038" y="1182807"/>
+            <a:off x="8686038" y="993584"/>
             <a:ext cx="2743200" cy="365760"/>
           </a:xfrm>
         </p:spPr>
@@ -30787,7 +30787,7 @@
           <a:p>
             <a:r>
               <a:rPr lang="en-ZA" dirty="0"/>
-              <a:t>TESTED</a:t>
+              <a:t>Customer Consent</a:t>
             </a:r>
             <a:endParaRPr lang="en-US" dirty="0"/>
           </a:p>
@@ -30811,7 +30811,7 @@
         </p:nvSpPr>
         <p:spPr>
           <a:xfrm>
-            <a:off x="8686038" y="1531890"/>
+            <a:off x="8610600" y="1521738"/>
             <a:ext cx="2743200" cy="914400"/>
           </a:xfrm>
         </p:spPr>
@@ -30821,7 +30821,7 @@
           <a:p>
             <a:r>
               <a:rPr lang="en-ZA" dirty="0"/>
-              <a:t>Conducted testing with businesses in the area</a:t>
+              <a:t>Customers should be aware the propose of data usage (consent may required by regulation like GDPR)</a:t>
             </a:r>
             <a:endParaRPr lang="en-US" dirty="0"/>
           </a:p>
@@ -30855,7 +30855,7 @@
           <a:p>
             <a:r>
               <a:rPr lang="en-ZA" dirty="0"/>
-              <a:t>AUTHENTIC</a:t>
+              <a:t>Bias and Fairness</a:t>
             </a:r>
             <a:endParaRPr lang="en-US" dirty="0"/>
           </a:p>
@@ -30888,8 +30888,13 @@
           <a:lstStyle/>
           <a:p>
             <a:r>
-              <a:rPr lang="en-ZA" dirty="0"/>
-              <a:t>Designed with the help and input of investment experts in the field </a:t>
+              <a:rPr lang="en-CA" dirty="0">
+                <a:effectLst/>
+                <a:latin typeface="Calibri" panose="020F0502020204030204" pitchFamily="34" charset="0"/>
+                <a:ea typeface="DengXian" panose="02010600030101010101" pitchFamily="2" charset="-122"/>
+                <a:cs typeface="Times New Roman" panose="02020603050405020304" pitchFamily="18" charset="0"/>
+              </a:rPr>
+              <a:t>Model could inadvertently discriminate against certain groups of customers if the training data includes biased or discriminatory patterns</a:t>
             </a:r>
             <a:endParaRPr lang="en-US" dirty="0"/>
           </a:p>
@@ -30992,6 +30997,826 @@
               <a:pPr/>
               <a:t>6</a:t>
             </a:fld>
+            <a:endParaRPr lang="en-US" dirty="0"/>
+          </a:p>
+        </p:txBody>
+      </p:sp>
+      <p:sp>
+        <p:nvSpPr>
+          <p:cNvPr id="7" name="Text Placeholder 24">
+            <a:extLst>
+              <a:ext uri="{FF2B5EF4-FFF2-40B4-BE49-F238E27FC236}">
+                <a16:creationId xmlns:a16="http://schemas.microsoft.com/office/drawing/2014/main" id="{3888BEC5-D1D2-69DE-4F32-753EFF065BD5}"/>
+              </a:ext>
+            </a:extLst>
+          </p:cNvPr>
+          <p:cNvSpPr txBox="1">
+            <a:spLocks/>
+          </p:cNvSpPr>
+          <p:nvPr/>
+        </p:nvSpPr>
+        <p:spPr>
+          <a:xfrm>
+            <a:off x="5638800" y="4512628"/>
+            <a:ext cx="2743200" cy="365760"/>
+          </a:xfrm>
+          <a:prstGeom prst="rect">
+            <a:avLst/>
+          </a:prstGeom>
+        </p:spPr>
+        <p:txBody>
+          <a:bodyPr vert="horz" lIns="91440" tIns="45720" rIns="91440" bIns="45720" rtlCol="0">
+            <a:noAutofit/>
+          </a:bodyPr>
+          <a:lstStyle>
+            <a:lvl1pPr marL="0" indent="0" algn="l" defTabSz="914400" rtl="0" eaLnBrk="1" latinLnBrk="0" hangingPunct="1">
+              <a:lnSpc>
+                <a:spcPct val="90000"/>
+              </a:lnSpc>
+              <a:spcBef>
+                <a:spcPts val="1000"/>
+              </a:spcBef>
+              <a:buFont typeface="Arial" panose="020B0604020202020204" pitchFamily="34" charset="0"/>
+              <a:buNone/>
+              <a:defRPr sz="1800" kern="1200" cap="all" baseline="0">
+                <a:solidFill>
+                  <a:schemeClr val="bg1"/>
+                </a:solidFill>
+                <a:latin typeface="+mj-lt"/>
+                <a:ea typeface="+mn-ea"/>
+                <a:cs typeface="+mn-cs"/>
+              </a:defRPr>
+            </a:lvl1pPr>
+            <a:lvl2pPr marL="457200" indent="0" algn="l" defTabSz="914400" rtl="0" eaLnBrk="1" latinLnBrk="0" hangingPunct="1">
+              <a:lnSpc>
+                <a:spcPct val="90000"/>
+              </a:lnSpc>
+              <a:spcBef>
+                <a:spcPts val="500"/>
+              </a:spcBef>
+              <a:buFont typeface="Arial" panose="020B0604020202020204" pitchFamily="34" charset="0"/>
+              <a:buNone/>
+              <a:defRPr sz="1800" kern="1200">
+                <a:solidFill>
+                  <a:schemeClr val="tx1"/>
+                </a:solidFill>
+                <a:latin typeface="+mj-lt"/>
+                <a:ea typeface="+mn-ea"/>
+                <a:cs typeface="+mn-cs"/>
+              </a:defRPr>
+            </a:lvl2pPr>
+            <a:lvl3pPr marL="914400" indent="0" algn="l" defTabSz="914400" rtl="0" eaLnBrk="1" latinLnBrk="0" hangingPunct="1">
+              <a:lnSpc>
+                <a:spcPct val="90000"/>
+              </a:lnSpc>
+              <a:spcBef>
+                <a:spcPts val="500"/>
+              </a:spcBef>
+              <a:buFont typeface="Arial" panose="020B0604020202020204" pitchFamily="34" charset="0"/>
+              <a:buNone/>
+              <a:defRPr sz="1800" kern="1200">
+                <a:solidFill>
+                  <a:schemeClr val="tx1"/>
+                </a:solidFill>
+                <a:latin typeface="+mj-lt"/>
+                <a:ea typeface="+mn-ea"/>
+                <a:cs typeface="+mn-cs"/>
+              </a:defRPr>
+            </a:lvl3pPr>
+            <a:lvl4pPr marL="1371600" indent="0" algn="l" defTabSz="914400" rtl="0" eaLnBrk="1" latinLnBrk="0" hangingPunct="1">
+              <a:lnSpc>
+                <a:spcPct val="90000"/>
+              </a:lnSpc>
+              <a:spcBef>
+                <a:spcPts val="500"/>
+              </a:spcBef>
+              <a:buFont typeface="Arial" panose="020B0604020202020204" pitchFamily="34" charset="0"/>
+              <a:buNone/>
+              <a:defRPr sz="1800" kern="1200">
+                <a:solidFill>
+                  <a:schemeClr val="tx1"/>
+                </a:solidFill>
+                <a:latin typeface="+mj-lt"/>
+                <a:ea typeface="+mn-ea"/>
+                <a:cs typeface="+mn-cs"/>
+              </a:defRPr>
+            </a:lvl4pPr>
+            <a:lvl5pPr marL="1828800" indent="0" algn="l" defTabSz="914400" rtl="0" eaLnBrk="1" latinLnBrk="0" hangingPunct="1">
+              <a:lnSpc>
+                <a:spcPct val="90000"/>
+              </a:lnSpc>
+              <a:spcBef>
+                <a:spcPts val="500"/>
+              </a:spcBef>
+              <a:buFont typeface="Arial" panose="020B0604020202020204" pitchFamily="34" charset="0"/>
+              <a:buNone/>
+              <a:defRPr sz="1800" kern="1200">
+                <a:solidFill>
+                  <a:schemeClr val="tx1"/>
+                </a:solidFill>
+                <a:latin typeface="+mj-lt"/>
+                <a:ea typeface="+mn-ea"/>
+                <a:cs typeface="+mn-cs"/>
+              </a:defRPr>
+            </a:lvl5pPr>
+            <a:lvl6pPr marL="2514600" indent="-228600" algn="l" defTabSz="914400" rtl="0" eaLnBrk="1" latinLnBrk="0" hangingPunct="1">
+              <a:lnSpc>
+                <a:spcPct val="90000"/>
+              </a:lnSpc>
+              <a:spcBef>
+                <a:spcPts val="500"/>
+              </a:spcBef>
+              <a:buFont typeface="Arial" panose="020B0604020202020204" pitchFamily="34" charset="0"/>
+              <a:buChar char="•"/>
+              <a:defRPr sz="1800" kern="1200">
+                <a:solidFill>
+                  <a:schemeClr val="tx1"/>
+                </a:solidFill>
+                <a:latin typeface="+mn-lt"/>
+                <a:ea typeface="+mn-ea"/>
+                <a:cs typeface="+mn-cs"/>
+              </a:defRPr>
+            </a:lvl6pPr>
+            <a:lvl7pPr marL="2971800" indent="-228600" algn="l" defTabSz="914400" rtl="0" eaLnBrk="1" latinLnBrk="0" hangingPunct="1">
+              <a:lnSpc>
+                <a:spcPct val="90000"/>
+              </a:lnSpc>
+              <a:spcBef>
+                <a:spcPts val="500"/>
+              </a:spcBef>
+              <a:buFont typeface="Arial" panose="020B0604020202020204" pitchFamily="34" charset="0"/>
+              <a:buChar char="•"/>
+              <a:defRPr sz="1800" kern="1200">
+                <a:solidFill>
+                  <a:schemeClr val="tx1"/>
+                </a:solidFill>
+                <a:latin typeface="+mn-lt"/>
+                <a:ea typeface="+mn-ea"/>
+                <a:cs typeface="+mn-cs"/>
+              </a:defRPr>
+            </a:lvl7pPr>
+            <a:lvl8pPr marL="3429000" indent="-228600" algn="l" defTabSz="914400" rtl="0" eaLnBrk="1" latinLnBrk="0" hangingPunct="1">
+              <a:lnSpc>
+                <a:spcPct val="90000"/>
+              </a:lnSpc>
+              <a:spcBef>
+                <a:spcPts val="500"/>
+              </a:spcBef>
+              <a:buFont typeface="Arial" panose="020B0604020202020204" pitchFamily="34" charset="0"/>
+              <a:buChar char="•"/>
+              <a:defRPr sz="1800" kern="1200">
+                <a:solidFill>
+                  <a:schemeClr val="tx1"/>
+                </a:solidFill>
+                <a:latin typeface="+mn-lt"/>
+                <a:ea typeface="+mn-ea"/>
+                <a:cs typeface="+mn-cs"/>
+              </a:defRPr>
+            </a:lvl8pPr>
+            <a:lvl9pPr marL="3886200" indent="-228600" algn="l" defTabSz="914400" rtl="0" eaLnBrk="1" latinLnBrk="0" hangingPunct="1">
+              <a:lnSpc>
+                <a:spcPct val="90000"/>
+              </a:lnSpc>
+              <a:spcBef>
+                <a:spcPts val="500"/>
+              </a:spcBef>
+              <a:buFont typeface="Arial" panose="020B0604020202020204" pitchFamily="34" charset="0"/>
+              <a:buChar char="•"/>
+              <a:defRPr sz="1800" kern="1200">
+                <a:solidFill>
+                  <a:schemeClr val="tx1"/>
+                </a:solidFill>
+                <a:latin typeface="+mn-lt"/>
+                <a:ea typeface="+mn-ea"/>
+                <a:cs typeface="+mn-cs"/>
+              </a:defRPr>
+            </a:lvl9pPr>
+          </a:lstStyle>
+          <a:p>
+            <a:r>
+              <a:rPr lang="en-ZA" dirty="0"/>
+              <a:t>Accountability</a:t>
+            </a:r>
+            <a:endParaRPr lang="en-US" dirty="0"/>
+          </a:p>
+        </p:txBody>
+      </p:sp>
+      <p:sp>
+        <p:nvSpPr>
+          <p:cNvPr id="9" name="Text Placeholder 25">
+            <a:extLst>
+              <a:ext uri="{FF2B5EF4-FFF2-40B4-BE49-F238E27FC236}">
+                <a16:creationId xmlns:a16="http://schemas.microsoft.com/office/drawing/2014/main" id="{35EFD751-B668-76C1-915D-49C0DF9C06AB}"/>
+              </a:ext>
+            </a:extLst>
+          </p:cNvPr>
+          <p:cNvSpPr txBox="1">
+            <a:spLocks/>
+          </p:cNvSpPr>
+          <p:nvPr/>
+        </p:nvSpPr>
+        <p:spPr>
+          <a:xfrm>
+            <a:off x="5638800" y="4842661"/>
+            <a:ext cx="2743200" cy="914400"/>
+          </a:xfrm>
+          <a:prstGeom prst="rect">
+            <a:avLst/>
+          </a:prstGeom>
+        </p:spPr>
+        <p:txBody>
+          <a:bodyPr vert="horz" lIns="91440" tIns="45720" rIns="91440" bIns="45720" rtlCol="0">
+            <a:noAutofit/>
+          </a:bodyPr>
+          <a:lstStyle>
+            <a:lvl1pPr marL="0" indent="0" algn="l" defTabSz="914400" rtl="0" eaLnBrk="1" latinLnBrk="0" hangingPunct="1">
+              <a:lnSpc>
+                <a:spcPts val="2000"/>
+              </a:lnSpc>
+              <a:spcBef>
+                <a:spcPts val="0"/>
+              </a:spcBef>
+              <a:buFont typeface="Arial" panose="020B0604020202020204" pitchFamily="34" charset="0"/>
+              <a:buNone/>
+              <a:defRPr sz="1400" kern="1200">
+                <a:solidFill>
+                  <a:schemeClr val="bg1"/>
+                </a:solidFill>
+                <a:latin typeface="+mn-lt"/>
+                <a:ea typeface="+mn-ea"/>
+                <a:cs typeface="+mn-cs"/>
+              </a:defRPr>
+            </a:lvl1pPr>
+            <a:lvl2pPr marL="457200" indent="0" algn="l" defTabSz="914400" rtl="0" eaLnBrk="1" latinLnBrk="0" hangingPunct="1">
+              <a:lnSpc>
+                <a:spcPct val="90000"/>
+              </a:lnSpc>
+              <a:spcBef>
+                <a:spcPts val="500"/>
+              </a:spcBef>
+              <a:buFont typeface="Arial" panose="020B0604020202020204" pitchFamily="34" charset="0"/>
+              <a:buNone/>
+              <a:defRPr sz="1600" kern="1200">
+                <a:solidFill>
+                  <a:schemeClr val="tx1"/>
+                </a:solidFill>
+                <a:latin typeface="+mn-lt"/>
+                <a:ea typeface="+mn-ea"/>
+                <a:cs typeface="+mn-cs"/>
+              </a:defRPr>
+            </a:lvl2pPr>
+            <a:lvl3pPr marL="914400" indent="0" algn="l" defTabSz="914400" rtl="0" eaLnBrk="1" latinLnBrk="0" hangingPunct="1">
+              <a:lnSpc>
+                <a:spcPct val="90000"/>
+              </a:lnSpc>
+              <a:spcBef>
+                <a:spcPts val="500"/>
+              </a:spcBef>
+              <a:buFont typeface="Arial" panose="020B0604020202020204" pitchFamily="34" charset="0"/>
+              <a:buNone/>
+              <a:defRPr sz="1600" kern="1200">
+                <a:solidFill>
+                  <a:schemeClr val="tx1"/>
+                </a:solidFill>
+                <a:latin typeface="+mn-lt"/>
+                <a:ea typeface="+mn-ea"/>
+                <a:cs typeface="+mn-cs"/>
+              </a:defRPr>
+            </a:lvl3pPr>
+            <a:lvl4pPr marL="1371600" indent="0" algn="l" defTabSz="914400" rtl="0" eaLnBrk="1" latinLnBrk="0" hangingPunct="1">
+              <a:lnSpc>
+                <a:spcPct val="90000"/>
+              </a:lnSpc>
+              <a:spcBef>
+                <a:spcPts val="500"/>
+              </a:spcBef>
+              <a:buFont typeface="Arial" panose="020B0604020202020204" pitchFamily="34" charset="0"/>
+              <a:buNone/>
+              <a:defRPr sz="1600" kern="1200">
+                <a:solidFill>
+                  <a:schemeClr val="tx1"/>
+                </a:solidFill>
+                <a:latin typeface="+mn-lt"/>
+                <a:ea typeface="+mn-ea"/>
+                <a:cs typeface="+mn-cs"/>
+              </a:defRPr>
+            </a:lvl4pPr>
+            <a:lvl5pPr marL="1828800" indent="0" algn="l" defTabSz="914400" rtl="0" eaLnBrk="1" latinLnBrk="0" hangingPunct="1">
+              <a:lnSpc>
+                <a:spcPct val="90000"/>
+              </a:lnSpc>
+              <a:spcBef>
+                <a:spcPts val="500"/>
+              </a:spcBef>
+              <a:buFont typeface="Arial" panose="020B0604020202020204" pitchFamily="34" charset="0"/>
+              <a:buNone/>
+              <a:defRPr sz="1600" kern="1200">
+                <a:solidFill>
+                  <a:schemeClr val="tx1"/>
+                </a:solidFill>
+                <a:latin typeface="+mn-lt"/>
+                <a:ea typeface="+mn-ea"/>
+                <a:cs typeface="+mn-cs"/>
+              </a:defRPr>
+            </a:lvl5pPr>
+            <a:lvl6pPr marL="2514600" indent="-228600" algn="l" defTabSz="914400" rtl="0" eaLnBrk="1" latinLnBrk="0" hangingPunct="1">
+              <a:lnSpc>
+                <a:spcPct val="90000"/>
+              </a:lnSpc>
+              <a:spcBef>
+                <a:spcPts val="500"/>
+              </a:spcBef>
+              <a:buFont typeface="Arial" panose="020B0604020202020204" pitchFamily="34" charset="0"/>
+              <a:buChar char="•"/>
+              <a:defRPr sz="1800" kern="1200">
+                <a:solidFill>
+                  <a:schemeClr val="tx1"/>
+                </a:solidFill>
+                <a:latin typeface="+mn-lt"/>
+                <a:ea typeface="+mn-ea"/>
+                <a:cs typeface="+mn-cs"/>
+              </a:defRPr>
+            </a:lvl6pPr>
+            <a:lvl7pPr marL="2971800" indent="-228600" algn="l" defTabSz="914400" rtl="0" eaLnBrk="1" latinLnBrk="0" hangingPunct="1">
+              <a:lnSpc>
+                <a:spcPct val="90000"/>
+              </a:lnSpc>
+              <a:spcBef>
+                <a:spcPts val="500"/>
+              </a:spcBef>
+              <a:buFont typeface="Arial" panose="020B0604020202020204" pitchFamily="34" charset="0"/>
+              <a:buChar char="•"/>
+              <a:defRPr sz="1800" kern="1200">
+                <a:solidFill>
+                  <a:schemeClr val="tx1"/>
+                </a:solidFill>
+                <a:latin typeface="+mn-lt"/>
+                <a:ea typeface="+mn-ea"/>
+                <a:cs typeface="+mn-cs"/>
+              </a:defRPr>
+            </a:lvl7pPr>
+            <a:lvl8pPr marL="3429000" indent="-228600" algn="l" defTabSz="914400" rtl="0" eaLnBrk="1" latinLnBrk="0" hangingPunct="1">
+              <a:lnSpc>
+                <a:spcPct val="90000"/>
+              </a:lnSpc>
+              <a:spcBef>
+                <a:spcPts val="500"/>
+              </a:spcBef>
+              <a:buFont typeface="Arial" panose="020B0604020202020204" pitchFamily="34" charset="0"/>
+              <a:buChar char="•"/>
+              <a:defRPr sz="1800" kern="1200">
+                <a:solidFill>
+                  <a:schemeClr val="tx1"/>
+                </a:solidFill>
+                <a:latin typeface="+mn-lt"/>
+                <a:ea typeface="+mn-ea"/>
+                <a:cs typeface="+mn-cs"/>
+              </a:defRPr>
+            </a:lvl8pPr>
+            <a:lvl9pPr marL="3886200" indent="-228600" algn="l" defTabSz="914400" rtl="0" eaLnBrk="1" latinLnBrk="0" hangingPunct="1">
+              <a:lnSpc>
+                <a:spcPct val="90000"/>
+              </a:lnSpc>
+              <a:spcBef>
+                <a:spcPts val="500"/>
+              </a:spcBef>
+              <a:buFont typeface="Arial" panose="020B0604020202020204" pitchFamily="34" charset="0"/>
+              <a:buChar char="•"/>
+              <a:defRPr sz="1800" kern="1200">
+                <a:solidFill>
+                  <a:schemeClr val="tx1"/>
+                </a:solidFill>
+                <a:latin typeface="+mn-lt"/>
+                <a:ea typeface="+mn-ea"/>
+                <a:cs typeface="+mn-cs"/>
+              </a:defRPr>
+            </a:lvl9pPr>
+          </a:lstStyle>
+          <a:p>
+            <a:r>
+              <a:rPr lang="en-CA" dirty="0">
+                <a:effectLst/>
+                <a:ea typeface="DengXian" panose="02010600030101010101" pitchFamily="2" charset="-122"/>
+                <a:cs typeface="Times New Roman" panose="02020603050405020304" pitchFamily="18" charset="0"/>
+              </a:rPr>
+              <a:t>The bank, the developers of the algorithm, or others involved in its creation and implementation might be implicated</a:t>
+            </a:r>
+            <a:r>
+              <a:rPr lang="en-CA" dirty="0">
+                <a:effectLst/>
+              </a:rPr>
+              <a:t> with accountability issue.</a:t>
+            </a:r>
+            <a:endParaRPr lang="en-US" dirty="0"/>
+          </a:p>
+        </p:txBody>
+      </p:sp>
+      <p:sp>
+        <p:nvSpPr>
+          <p:cNvPr id="10" name="Text Placeholder 24">
+            <a:extLst>
+              <a:ext uri="{FF2B5EF4-FFF2-40B4-BE49-F238E27FC236}">
+                <a16:creationId xmlns:a16="http://schemas.microsoft.com/office/drawing/2014/main" id="{4A8FC824-2178-0F95-3434-4671E674B7C0}"/>
+              </a:ext>
+            </a:extLst>
+          </p:cNvPr>
+          <p:cNvSpPr txBox="1">
+            <a:spLocks/>
+          </p:cNvSpPr>
+          <p:nvPr/>
+        </p:nvSpPr>
+        <p:spPr>
+          <a:xfrm>
+            <a:off x="8610600" y="4512628"/>
+            <a:ext cx="2743200" cy="365760"/>
+          </a:xfrm>
+          <a:prstGeom prst="rect">
+            <a:avLst/>
+          </a:prstGeom>
+        </p:spPr>
+        <p:txBody>
+          <a:bodyPr vert="horz" lIns="91440" tIns="45720" rIns="91440" bIns="45720" rtlCol="0">
+            <a:noAutofit/>
+          </a:bodyPr>
+          <a:lstStyle>
+            <a:lvl1pPr marL="0" indent="0" algn="l" defTabSz="914400" rtl="0" eaLnBrk="1" latinLnBrk="0" hangingPunct="1">
+              <a:lnSpc>
+                <a:spcPct val="90000"/>
+              </a:lnSpc>
+              <a:spcBef>
+                <a:spcPts val="1000"/>
+              </a:spcBef>
+              <a:buFont typeface="Arial" panose="020B0604020202020204" pitchFamily="34" charset="0"/>
+              <a:buNone/>
+              <a:defRPr sz="1800" kern="1200" cap="all" baseline="0">
+                <a:solidFill>
+                  <a:schemeClr val="bg1"/>
+                </a:solidFill>
+                <a:latin typeface="+mj-lt"/>
+                <a:ea typeface="+mn-ea"/>
+                <a:cs typeface="+mn-cs"/>
+              </a:defRPr>
+            </a:lvl1pPr>
+            <a:lvl2pPr marL="457200" indent="0" algn="l" defTabSz="914400" rtl="0" eaLnBrk="1" latinLnBrk="0" hangingPunct="1">
+              <a:lnSpc>
+                <a:spcPct val="90000"/>
+              </a:lnSpc>
+              <a:spcBef>
+                <a:spcPts val="500"/>
+              </a:spcBef>
+              <a:buFont typeface="Arial" panose="020B0604020202020204" pitchFamily="34" charset="0"/>
+              <a:buNone/>
+              <a:defRPr sz="1800" kern="1200">
+                <a:solidFill>
+                  <a:schemeClr val="tx1"/>
+                </a:solidFill>
+                <a:latin typeface="+mj-lt"/>
+                <a:ea typeface="+mn-ea"/>
+                <a:cs typeface="+mn-cs"/>
+              </a:defRPr>
+            </a:lvl2pPr>
+            <a:lvl3pPr marL="914400" indent="0" algn="l" defTabSz="914400" rtl="0" eaLnBrk="1" latinLnBrk="0" hangingPunct="1">
+              <a:lnSpc>
+                <a:spcPct val="90000"/>
+              </a:lnSpc>
+              <a:spcBef>
+                <a:spcPts val="500"/>
+              </a:spcBef>
+              <a:buFont typeface="Arial" panose="020B0604020202020204" pitchFamily="34" charset="0"/>
+              <a:buNone/>
+              <a:defRPr sz="1800" kern="1200">
+                <a:solidFill>
+                  <a:schemeClr val="tx1"/>
+                </a:solidFill>
+                <a:latin typeface="+mj-lt"/>
+                <a:ea typeface="+mn-ea"/>
+                <a:cs typeface="+mn-cs"/>
+              </a:defRPr>
+            </a:lvl3pPr>
+            <a:lvl4pPr marL="1371600" indent="0" algn="l" defTabSz="914400" rtl="0" eaLnBrk="1" latinLnBrk="0" hangingPunct="1">
+              <a:lnSpc>
+                <a:spcPct val="90000"/>
+              </a:lnSpc>
+              <a:spcBef>
+                <a:spcPts val="500"/>
+              </a:spcBef>
+              <a:buFont typeface="Arial" panose="020B0604020202020204" pitchFamily="34" charset="0"/>
+              <a:buNone/>
+              <a:defRPr sz="1800" kern="1200">
+                <a:solidFill>
+                  <a:schemeClr val="tx1"/>
+                </a:solidFill>
+                <a:latin typeface="+mj-lt"/>
+                <a:ea typeface="+mn-ea"/>
+                <a:cs typeface="+mn-cs"/>
+              </a:defRPr>
+            </a:lvl4pPr>
+            <a:lvl5pPr marL="1828800" indent="0" algn="l" defTabSz="914400" rtl="0" eaLnBrk="1" latinLnBrk="0" hangingPunct="1">
+              <a:lnSpc>
+                <a:spcPct val="90000"/>
+              </a:lnSpc>
+              <a:spcBef>
+                <a:spcPts val="500"/>
+              </a:spcBef>
+              <a:buFont typeface="Arial" panose="020B0604020202020204" pitchFamily="34" charset="0"/>
+              <a:buNone/>
+              <a:defRPr sz="1800" kern="1200">
+                <a:solidFill>
+                  <a:schemeClr val="tx1"/>
+                </a:solidFill>
+                <a:latin typeface="+mj-lt"/>
+                <a:ea typeface="+mn-ea"/>
+                <a:cs typeface="+mn-cs"/>
+              </a:defRPr>
+            </a:lvl5pPr>
+            <a:lvl6pPr marL="2514600" indent="-228600" algn="l" defTabSz="914400" rtl="0" eaLnBrk="1" latinLnBrk="0" hangingPunct="1">
+              <a:lnSpc>
+                <a:spcPct val="90000"/>
+              </a:lnSpc>
+              <a:spcBef>
+                <a:spcPts val="500"/>
+              </a:spcBef>
+              <a:buFont typeface="Arial" panose="020B0604020202020204" pitchFamily="34" charset="0"/>
+              <a:buChar char="•"/>
+              <a:defRPr sz="1800" kern="1200">
+                <a:solidFill>
+                  <a:schemeClr val="tx1"/>
+                </a:solidFill>
+                <a:latin typeface="+mn-lt"/>
+                <a:ea typeface="+mn-ea"/>
+                <a:cs typeface="+mn-cs"/>
+              </a:defRPr>
+            </a:lvl6pPr>
+            <a:lvl7pPr marL="2971800" indent="-228600" algn="l" defTabSz="914400" rtl="0" eaLnBrk="1" latinLnBrk="0" hangingPunct="1">
+              <a:lnSpc>
+                <a:spcPct val="90000"/>
+              </a:lnSpc>
+              <a:spcBef>
+                <a:spcPts val="500"/>
+              </a:spcBef>
+              <a:buFont typeface="Arial" panose="020B0604020202020204" pitchFamily="34" charset="0"/>
+              <a:buChar char="•"/>
+              <a:defRPr sz="1800" kern="1200">
+                <a:solidFill>
+                  <a:schemeClr val="tx1"/>
+                </a:solidFill>
+                <a:latin typeface="+mn-lt"/>
+                <a:ea typeface="+mn-ea"/>
+                <a:cs typeface="+mn-cs"/>
+              </a:defRPr>
+            </a:lvl7pPr>
+            <a:lvl8pPr marL="3429000" indent="-228600" algn="l" defTabSz="914400" rtl="0" eaLnBrk="1" latinLnBrk="0" hangingPunct="1">
+              <a:lnSpc>
+                <a:spcPct val="90000"/>
+              </a:lnSpc>
+              <a:spcBef>
+                <a:spcPts val="500"/>
+              </a:spcBef>
+              <a:buFont typeface="Arial" panose="020B0604020202020204" pitchFamily="34" charset="0"/>
+              <a:buChar char="•"/>
+              <a:defRPr sz="1800" kern="1200">
+                <a:solidFill>
+                  <a:schemeClr val="tx1"/>
+                </a:solidFill>
+                <a:latin typeface="+mn-lt"/>
+                <a:ea typeface="+mn-ea"/>
+                <a:cs typeface="+mn-cs"/>
+              </a:defRPr>
+            </a:lvl8pPr>
+            <a:lvl9pPr marL="3886200" indent="-228600" algn="l" defTabSz="914400" rtl="0" eaLnBrk="1" latinLnBrk="0" hangingPunct="1">
+              <a:lnSpc>
+                <a:spcPct val="90000"/>
+              </a:lnSpc>
+              <a:spcBef>
+                <a:spcPts val="500"/>
+              </a:spcBef>
+              <a:buFont typeface="Arial" panose="020B0604020202020204" pitchFamily="34" charset="0"/>
+              <a:buChar char="•"/>
+              <a:defRPr sz="1800" kern="1200">
+                <a:solidFill>
+                  <a:schemeClr val="tx1"/>
+                </a:solidFill>
+                <a:latin typeface="+mn-lt"/>
+                <a:ea typeface="+mn-ea"/>
+                <a:cs typeface="+mn-cs"/>
+              </a:defRPr>
+            </a:lvl9pPr>
+          </a:lstStyle>
+          <a:p>
+            <a:r>
+              <a:rPr lang="en-ZA" dirty="0"/>
+              <a:t>Potential Misuse</a:t>
+            </a:r>
+            <a:endParaRPr lang="en-US" dirty="0"/>
+          </a:p>
+        </p:txBody>
+      </p:sp>
+      <p:sp>
+        <p:nvSpPr>
+          <p:cNvPr id="11" name="Text Placeholder 25">
+            <a:extLst>
+              <a:ext uri="{FF2B5EF4-FFF2-40B4-BE49-F238E27FC236}">
+                <a16:creationId xmlns:a16="http://schemas.microsoft.com/office/drawing/2014/main" id="{3263CE85-6A9C-00D4-753A-B16EC6CE0159}"/>
+              </a:ext>
+            </a:extLst>
+          </p:cNvPr>
+          <p:cNvSpPr txBox="1">
+            <a:spLocks/>
+          </p:cNvSpPr>
+          <p:nvPr/>
+        </p:nvSpPr>
+        <p:spPr>
+          <a:xfrm>
+            <a:off x="8610600" y="4842661"/>
+            <a:ext cx="2743200" cy="914400"/>
+          </a:xfrm>
+          <a:prstGeom prst="rect">
+            <a:avLst/>
+          </a:prstGeom>
+        </p:spPr>
+        <p:txBody>
+          <a:bodyPr vert="horz" lIns="91440" tIns="45720" rIns="91440" bIns="45720" rtlCol="0">
+            <a:noAutofit/>
+          </a:bodyPr>
+          <a:lstStyle>
+            <a:lvl1pPr marL="0" indent="0" algn="l" defTabSz="914400" rtl="0" eaLnBrk="1" latinLnBrk="0" hangingPunct="1">
+              <a:lnSpc>
+                <a:spcPts val="2000"/>
+              </a:lnSpc>
+              <a:spcBef>
+                <a:spcPts val="0"/>
+              </a:spcBef>
+              <a:buFont typeface="Arial" panose="020B0604020202020204" pitchFamily="34" charset="0"/>
+              <a:buNone/>
+              <a:defRPr sz="1400" kern="1200">
+                <a:solidFill>
+                  <a:schemeClr val="bg1"/>
+                </a:solidFill>
+                <a:latin typeface="+mn-lt"/>
+                <a:ea typeface="+mn-ea"/>
+                <a:cs typeface="+mn-cs"/>
+              </a:defRPr>
+            </a:lvl1pPr>
+            <a:lvl2pPr marL="457200" indent="0" algn="l" defTabSz="914400" rtl="0" eaLnBrk="1" latinLnBrk="0" hangingPunct="1">
+              <a:lnSpc>
+                <a:spcPct val="90000"/>
+              </a:lnSpc>
+              <a:spcBef>
+                <a:spcPts val="500"/>
+              </a:spcBef>
+              <a:buFont typeface="Arial" panose="020B0604020202020204" pitchFamily="34" charset="0"/>
+              <a:buNone/>
+              <a:defRPr sz="1600" kern="1200">
+                <a:solidFill>
+                  <a:schemeClr val="tx1"/>
+                </a:solidFill>
+                <a:latin typeface="+mn-lt"/>
+                <a:ea typeface="+mn-ea"/>
+                <a:cs typeface="+mn-cs"/>
+              </a:defRPr>
+            </a:lvl2pPr>
+            <a:lvl3pPr marL="914400" indent="0" algn="l" defTabSz="914400" rtl="0" eaLnBrk="1" latinLnBrk="0" hangingPunct="1">
+              <a:lnSpc>
+                <a:spcPct val="90000"/>
+              </a:lnSpc>
+              <a:spcBef>
+                <a:spcPts val="500"/>
+              </a:spcBef>
+              <a:buFont typeface="Arial" panose="020B0604020202020204" pitchFamily="34" charset="0"/>
+              <a:buNone/>
+              <a:defRPr sz="1600" kern="1200">
+                <a:solidFill>
+                  <a:schemeClr val="tx1"/>
+                </a:solidFill>
+                <a:latin typeface="+mn-lt"/>
+                <a:ea typeface="+mn-ea"/>
+                <a:cs typeface="+mn-cs"/>
+              </a:defRPr>
+            </a:lvl3pPr>
+            <a:lvl4pPr marL="1371600" indent="0" algn="l" defTabSz="914400" rtl="0" eaLnBrk="1" latinLnBrk="0" hangingPunct="1">
+              <a:lnSpc>
+                <a:spcPct val="90000"/>
+              </a:lnSpc>
+              <a:spcBef>
+                <a:spcPts val="500"/>
+              </a:spcBef>
+              <a:buFont typeface="Arial" panose="020B0604020202020204" pitchFamily="34" charset="0"/>
+              <a:buNone/>
+              <a:defRPr sz="1600" kern="1200">
+                <a:solidFill>
+                  <a:schemeClr val="tx1"/>
+                </a:solidFill>
+                <a:latin typeface="+mn-lt"/>
+                <a:ea typeface="+mn-ea"/>
+                <a:cs typeface="+mn-cs"/>
+              </a:defRPr>
+            </a:lvl4pPr>
+            <a:lvl5pPr marL="1828800" indent="0" algn="l" defTabSz="914400" rtl="0" eaLnBrk="1" latinLnBrk="0" hangingPunct="1">
+              <a:lnSpc>
+                <a:spcPct val="90000"/>
+              </a:lnSpc>
+              <a:spcBef>
+                <a:spcPts val="500"/>
+              </a:spcBef>
+              <a:buFont typeface="Arial" panose="020B0604020202020204" pitchFamily="34" charset="0"/>
+              <a:buNone/>
+              <a:defRPr sz="1600" kern="1200">
+                <a:solidFill>
+                  <a:schemeClr val="tx1"/>
+                </a:solidFill>
+                <a:latin typeface="+mn-lt"/>
+                <a:ea typeface="+mn-ea"/>
+                <a:cs typeface="+mn-cs"/>
+              </a:defRPr>
+            </a:lvl5pPr>
+            <a:lvl6pPr marL="2514600" indent="-228600" algn="l" defTabSz="914400" rtl="0" eaLnBrk="1" latinLnBrk="0" hangingPunct="1">
+              <a:lnSpc>
+                <a:spcPct val="90000"/>
+              </a:lnSpc>
+              <a:spcBef>
+                <a:spcPts val="500"/>
+              </a:spcBef>
+              <a:buFont typeface="Arial" panose="020B0604020202020204" pitchFamily="34" charset="0"/>
+              <a:buChar char="•"/>
+              <a:defRPr sz="1800" kern="1200">
+                <a:solidFill>
+                  <a:schemeClr val="tx1"/>
+                </a:solidFill>
+                <a:latin typeface="+mn-lt"/>
+                <a:ea typeface="+mn-ea"/>
+                <a:cs typeface="+mn-cs"/>
+              </a:defRPr>
+            </a:lvl6pPr>
+            <a:lvl7pPr marL="2971800" indent="-228600" algn="l" defTabSz="914400" rtl="0" eaLnBrk="1" latinLnBrk="0" hangingPunct="1">
+              <a:lnSpc>
+                <a:spcPct val="90000"/>
+              </a:lnSpc>
+              <a:spcBef>
+                <a:spcPts val="500"/>
+              </a:spcBef>
+              <a:buFont typeface="Arial" panose="020B0604020202020204" pitchFamily="34" charset="0"/>
+              <a:buChar char="•"/>
+              <a:defRPr sz="1800" kern="1200">
+                <a:solidFill>
+                  <a:schemeClr val="tx1"/>
+                </a:solidFill>
+                <a:latin typeface="+mn-lt"/>
+                <a:ea typeface="+mn-ea"/>
+                <a:cs typeface="+mn-cs"/>
+              </a:defRPr>
+            </a:lvl7pPr>
+            <a:lvl8pPr marL="3429000" indent="-228600" algn="l" defTabSz="914400" rtl="0" eaLnBrk="1" latinLnBrk="0" hangingPunct="1">
+              <a:lnSpc>
+                <a:spcPct val="90000"/>
+              </a:lnSpc>
+              <a:spcBef>
+                <a:spcPts val="500"/>
+              </a:spcBef>
+              <a:buFont typeface="Arial" panose="020B0604020202020204" pitchFamily="34" charset="0"/>
+              <a:buChar char="•"/>
+              <a:defRPr sz="1800" kern="1200">
+                <a:solidFill>
+                  <a:schemeClr val="tx1"/>
+                </a:solidFill>
+                <a:latin typeface="+mn-lt"/>
+                <a:ea typeface="+mn-ea"/>
+                <a:cs typeface="+mn-cs"/>
+              </a:defRPr>
+            </a:lvl8pPr>
+            <a:lvl9pPr marL="3886200" indent="-228600" algn="l" defTabSz="914400" rtl="0" eaLnBrk="1" latinLnBrk="0" hangingPunct="1">
+              <a:lnSpc>
+                <a:spcPct val="90000"/>
+              </a:lnSpc>
+              <a:spcBef>
+                <a:spcPts val="500"/>
+              </a:spcBef>
+              <a:buFont typeface="Arial" panose="020B0604020202020204" pitchFamily="34" charset="0"/>
+              <a:buChar char="•"/>
+              <a:defRPr sz="1800" kern="1200">
+                <a:solidFill>
+                  <a:schemeClr val="tx1"/>
+                </a:solidFill>
+                <a:latin typeface="+mn-lt"/>
+                <a:ea typeface="+mn-ea"/>
+                <a:cs typeface="+mn-cs"/>
+              </a:defRPr>
+            </a:lvl9pPr>
+          </a:lstStyle>
+          <a:p>
+            <a:r>
+              <a:rPr lang="en-CA" dirty="0">
+                <a:effectLst/>
+                <a:ea typeface="DengXian" panose="02010600030101010101" pitchFamily="2" charset="-122"/>
+                <a:cs typeface="Times New Roman" panose="02020603050405020304" pitchFamily="18" charset="0"/>
+              </a:rPr>
+              <a:t>Such as denying services to those who are predicted to be more likely to cancel</a:t>
+            </a:r>
+            <a:r>
+              <a:rPr lang="en-CA" dirty="0">
+                <a:effectLst/>
+              </a:rPr>
+              <a:t> </a:t>
+            </a:r>
             <a:endParaRPr lang="en-US" dirty="0"/>
           </a:p>
         </p:txBody>
@@ -31111,8 +31936,8 @@
         </p:nvSpPr>
         <p:spPr>
           <a:xfrm>
-            <a:off x="914401" y="2000292"/>
-            <a:ext cx="3162299" cy="3409907"/>
+            <a:off x="914401" y="1376737"/>
+            <a:ext cx="4993240" cy="4979613"/>
           </a:xfrm>
         </p:spPr>
         <p:txBody>
@@ -31122,29 +31947,161 @@
           <a:lstStyle/>
           <a:p>
             <a:r>
+              <a:rPr lang="en-ZA" b="1" dirty="0"/>
+              <a:t>Data Collection: </a:t>
+            </a:r>
+            <a:r>
               <a:rPr lang="en-ZA" dirty="0"/>
-              <a:t>Simple and efficient to use</a:t>
-            </a:r>
-          </a:p>
-          <a:p>
+              <a:t>representative and diverse data </a:t>
+            </a:r>
+            <a:r>
+              <a:rPr lang="en-ZA" b="1" dirty="0"/>
+              <a:t>Data Processing: </a:t>
+            </a:r>
+            <a:r>
+              <a:rPr lang="en-ZA" dirty="0"/>
+              <a:t>examine potential biases.</a:t>
+            </a:r>
+          </a:p>
+          <a:p>
+            <a:r>
+              <a:rPr lang="en-ZA" b="1" dirty="0"/>
+              <a:t>Feature Selection: </a:t>
+            </a:r>
+            <a:r>
+              <a:rPr lang="en-CA" dirty="0">
+                <a:ea typeface="DengXian" panose="02010600030101010101" pitchFamily="2" charset="-122"/>
+                <a:cs typeface="Times New Roman" panose="02020603050405020304" pitchFamily="18" charset="0"/>
+              </a:rPr>
+              <a:t>a</a:t>
+            </a:r>
+            <a:r>
+              <a:rPr lang="en-CA" sz="1800" dirty="0">
+                <a:effectLst/>
+                <a:ea typeface="DengXian" panose="02010600030101010101" pitchFamily="2" charset="-122"/>
+                <a:cs typeface="Times New Roman" panose="02020603050405020304" pitchFamily="18" charset="0"/>
+              </a:rPr>
+              <a:t>void using features that could lead to discriminatory outcomes.</a:t>
+            </a:r>
+          </a:p>
+          <a:p>
+            <a:r>
+              <a:rPr lang="en-CA" sz="1800" b="1" dirty="0">
+                <a:effectLst/>
+                <a:ea typeface="DengXian" panose="02010600030101010101" pitchFamily="2" charset="-122"/>
+                <a:cs typeface="Times New Roman" panose="02020603050405020304" pitchFamily="18" charset="0"/>
+              </a:rPr>
+              <a:t>Model Selection and Training:</a:t>
+            </a:r>
+            <a:r>
+              <a:rPr lang="en-CA" b="1" dirty="0">
+                <a:effectLst/>
+              </a:rPr>
+              <a:t> </a:t>
+            </a:r>
+            <a:r>
+              <a:rPr lang="en-CA" sz="1800" dirty="0">
+                <a:effectLst/>
+                <a:ea typeface="DengXian" panose="02010600030101010101" pitchFamily="2" charset="-122"/>
+                <a:cs typeface="Times New Roman" panose="02020603050405020304" pitchFamily="18" charset="0"/>
+              </a:rPr>
+              <a:t>Using transparent and interpretable models </a:t>
+            </a:r>
+          </a:p>
+          <a:p>
+            <a:r>
+              <a:rPr lang="en-CA" sz="1800" b="1" dirty="0">
+                <a:effectLst/>
+                <a:ea typeface="DengXian" panose="02010600030101010101" pitchFamily="2" charset="-122"/>
+                <a:cs typeface="Times New Roman" panose="02020603050405020304" pitchFamily="18" charset="0"/>
+              </a:rPr>
+              <a:t>Transparency</a:t>
+            </a:r>
+            <a:r>
+              <a:rPr lang="en-CA" sz="1800" b="1" dirty="0">
+                <a:ea typeface="DengXian" panose="02010600030101010101" pitchFamily="2" charset="-122"/>
+                <a:cs typeface="Times New Roman" panose="02020603050405020304" pitchFamily="18" charset="0"/>
+              </a:rPr>
+              <a:t>: </a:t>
+            </a:r>
+            <a:r>
+              <a:rPr lang="en-CA" dirty="0">
+                <a:ea typeface="DengXian" panose="02010600030101010101" pitchFamily="2" charset="-122"/>
+                <a:cs typeface="Times New Roman" panose="02020603050405020304" pitchFamily="18" charset="0"/>
+              </a:rPr>
+              <a:t>use techniques to help explain model decisions.</a:t>
+            </a:r>
+            <a:endParaRPr lang="en-CA" sz="1800" dirty="0">
+              <a:effectLst/>
+              <a:ea typeface="DengXian" panose="02010600030101010101" pitchFamily="2" charset="-122"/>
+              <a:cs typeface="Times New Roman" panose="02020603050405020304" pitchFamily="18" charset="0"/>
+            </a:endParaRPr>
+          </a:p>
+          <a:p>
+            <a:r>
+              <a:rPr lang="en-ZA" b="1" dirty="0"/>
+              <a:t>Informed Consent: </a:t>
+            </a:r>
+            <a:r>
+              <a:rPr lang="en-ZA" dirty="0"/>
+              <a:t>ensure customer understand the purpose of data collection.</a:t>
+            </a:r>
+          </a:p>
+          <a:p>
+            <a:r>
+              <a:rPr lang="en-CA" sz="1800" b="1" dirty="0">
+                <a:effectLst/>
+                <a:ea typeface="DengXian" panose="02010600030101010101" pitchFamily="2" charset="-122"/>
+                <a:cs typeface="Times New Roman" panose="02020603050405020304" pitchFamily="18" charset="0"/>
+              </a:rPr>
+              <a:t>Involve Multiple Perspectives: </a:t>
+            </a:r>
+            <a:r>
+              <a:rPr lang="en-CA" sz="1800" dirty="0">
+                <a:effectLst/>
+                <a:ea typeface="DengXian" panose="02010600030101010101" pitchFamily="2" charset="-122"/>
+                <a:cs typeface="Times New Roman" panose="02020603050405020304" pitchFamily="18" charset="0"/>
+              </a:rPr>
+              <a:t>Including people with different expertise in the development </a:t>
+            </a:r>
             <a:endParaRPr lang="en-ZA" dirty="0"/>
           </a:p>
           <a:p>
             <a:r>
-              <a:rPr lang="en-ZA" noProof="1"/>
-              <a:t>Quick customer service assistance</a:t>
-            </a:r>
-          </a:p>
-          <a:p>
-            <a:endParaRPr lang="en-ZA" noProof="1"/>
-          </a:p>
-          <a:p>
-            <a:r>
-              <a:rPr lang="en-ZA" noProof="1"/>
-              <a:t>Free 90-day investment help for new customers</a:t>
-            </a:r>
-          </a:p>
-          <a:p>
+              <a:rPr lang="en-CA" sz="1800" b="1" dirty="0">
+                <a:effectLst/>
+                <a:ea typeface="DengXian" panose="02010600030101010101" pitchFamily="2" charset="-122"/>
+                <a:cs typeface="Times New Roman" panose="02020603050405020304" pitchFamily="18" charset="0"/>
+              </a:rPr>
+              <a:t>Privacy Measures: </a:t>
+            </a:r>
+            <a:r>
+              <a:rPr lang="en-CA" sz="1800" dirty="0">
+                <a:effectLst/>
+                <a:ea typeface="DengXian" panose="02010600030101010101" pitchFamily="2" charset="-122"/>
+                <a:cs typeface="Times New Roman" panose="02020603050405020304" pitchFamily="18" charset="0"/>
+              </a:rPr>
+              <a:t>strict data protection measures to secure customer data. </a:t>
+            </a:r>
+            <a:endParaRPr lang="en-ZA" dirty="0"/>
+          </a:p>
+          <a:p>
+            <a:r>
+              <a:rPr lang="en-CA" sz="1800" b="1" dirty="0">
+                <a:effectLst/>
+                <a:ea typeface="DengXian" panose="02010600030101010101" pitchFamily="2" charset="-122"/>
+                <a:cs typeface="Times New Roman" panose="02020603050405020304" pitchFamily="18" charset="0"/>
+              </a:rPr>
+              <a:t>Regular Auditing: </a:t>
+            </a:r>
+            <a:r>
+              <a:rPr lang="en-CA" sz="1800" dirty="0">
+                <a:effectLst/>
+                <a:ea typeface="DengXian" panose="02010600030101010101" pitchFamily="2" charset="-122"/>
+                <a:cs typeface="Times New Roman" panose="02020603050405020304" pitchFamily="18" charset="0"/>
+              </a:rPr>
+              <a:t>Periodically review and update the model </a:t>
+            </a:r>
             <a:endParaRPr lang="en-US" dirty="0"/>
           </a:p>
         </p:txBody>
@@ -32382,6 +33339,15 @@
 </file>
 
 <file path=customXml/item1.xml><?xml version="1.0" encoding="utf-8"?>
+<?mso-contentType ?>
+<FormTemplates xmlns="http://schemas.microsoft.com/sharepoint/v3/contenttype/forms">
+  <Display>DocumentLibraryForm</Display>
+  <Edit>DocumentLibraryForm</Edit>
+  <New>DocumentLibraryForm</New>
+</FormTemplates>
+</file>
+
+<file path=customXml/item2.xml><?xml version="1.0" encoding="utf-8"?>
 <ct:contentTypeSchema xmlns:ct="http://schemas.microsoft.com/office/2006/metadata/contentType" xmlns:ma="http://schemas.microsoft.com/office/2006/metadata/properties/metaAttributes" ct:_="" ma:_="" ma:contentTypeName="Document" ma:contentTypeID="0x01010079F111ED35F8CC479449609E8A0923A6" ma:contentTypeVersion="21" ma:contentTypeDescription="Create a new document." ma:contentTypeScope="" ma:versionID="64dfb1555687e0874b4304b796b5b0c7">
   <xsd:schema xmlns:xsd="http://www.w3.org/2001/XMLSchema" xmlns:xs="http://www.w3.org/2001/XMLSchema" xmlns:p="http://schemas.microsoft.com/office/2006/metadata/properties" xmlns:ns1="http://schemas.microsoft.com/sharepoint/v3" xmlns:ns2="71af3243-3dd4-4a8d-8c0d-dd76da1f02a5" xmlns:ns3="16c05727-aa75-4e4a-9b5f-8a80a1165891" xmlns:ns4="230e9df3-be65-4c73-a93b-d1236ebd677e" targetNamespace="http://schemas.microsoft.com/office/2006/metadata/properties" ma:root="true" ma:fieldsID="e6e4c555b5e194d05b7203de9c4567b3" ns1:_="" ns2:_="" ns3:_="" ns4:_="">
     <xsd:import namespace="http://schemas.microsoft.com/sharepoint/v3"/>
@@ -32663,15 +33629,6 @@
 </ct:contentTypeSchema>
 </file>
 
-<file path=customXml/item2.xml><?xml version="1.0" encoding="utf-8"?>
-<?mso-contentType ?>
-<FormTemplates xmlns="http://schemas.microsoft.com/sharepoint/v3/contenttype/forms">
-  <Display>DocumentLibraryForm</Display>
-  <Edit>DocumentLibraryForm</Edit>
-  <New>DocumentLibraryForm</New>
-</FormTemplates>
-</file>
-
 <file path=customXml/item3.xml><?xml version="1.0" encoding="utf-8"?>
 <p:properties xmlns:p="http://schemas.microsoft.com/office/2006/metadata/properties" xmlns:xsi="http://www.w3.org/2001/XMLSchema-instance" xmlns:pc="http://schemas.microsoft.com/office/infopath/2007/PartnerControls">
   <documentManagement>
@@ -32692,6 +33649,14 @@
 </file>
 
 <file path=customXml/itemProps1.xml><?xml version="1.0" encoding="utf-8"?>
+<ds:datastoreItem xmlns:ds="http://schemas.openxmlformats.org/officeDocument/2006/customXml" ds:itemID="{0FC5A798-286F-493A-A004-3C6C2A6B8B95}">
+  <ds:schemaRefs>
+    <ds:schemaRef ds:uri="http://schemas.microsoft.com/sharepoint/v3/contenttype/forms"/>
+  </ds:schemaRefs>
+</ds:datastoreItem>
+</file>
+
+<file path=customXml/itemProps2.xml><?xml version="1.0" encoding="utf-8"?>
 <ds:datastoreItem xmlns:ds="http://schemas.openxmlformats.org/officeDocument/2006/customXml" ds:itemID="{284AF623-4A95-4652-AF18-74D461A9667B}">
   <ds:schemaRefs>
     <ds:schemaRef ds:uri="http://schemas.microsoft.com/office/2006/metadata/contentType"/>
@@ -32708,14 +33673,6 @@
     <ds:schemaRef ds:uri="http://purl.org/dc/elements/1.1/"/>
     <ds:schemaRef ds:uri="http://purl.org/dc/terms/"/>
     <ds:schemaRef ds:uri="http://schemas.microsoft.com/internal/obd"/>
-  </ds:schemaRefs>
-</ds:datastoreItem>
-</file>
-
-<file path=customXml/itemProps2.xml><?xml version="1.0" encoding="utf-8"?>
-<ds:datastoreItem xmlns:ds="http://schemas.openxmlformats.org/officeDocument/2006/customXml" ds:itemID="{0FC5A798-286F-493A-A004-3C6C2A6B8B95}">
-  <ds:schemaRefs>
-    <ds:schemaRef ds:uri="http://schemas.microsoft.com/sharepoint/v3/contenttype/forms"/>
   </ds:schemaRefs>
 </ds:datastoreItem>
 </file>

</xml_diff>